<commit_message>
Add tudo do site
</commit_message>
<xml_diff>
--- a/documentacao/Apresentação Games.pptx
+++ b/documentacao/Apresentação Games.pptx
@@ -119,6 +119,35 @@
 </p:presentation>
 </file>
 
+<file path=ppt/changesInfos/changesInfo1.xml><?xml version="1.0" encoding="utf-8"?>
+<pc:chgInfo xmlns:a="http://schemas.openxmlformats.org/drawingml/2006/main" xmlns:r="http://schemas.openxmlformats.org/officeDocument/2006/relationships" xmlns:ac="http://schemas.microsoft.com/office/drawing/2013/main/command" xmlns:pc="http://schemas.microsoft.com/office/powerpoint/2013/main/command">
+  <pc:docChgLst>
+    <pc:chgData name="Marcos Antonio Garcia" userId="4924f6f5e1aaa61e" providerId="LiveId" clId="{09C1495C-8E32-402E-9C2F-2880E69A63EF}"/>
+    <pc:docChg chg="modSld">
+      <pc:chgData name="Marcos Antonio Garcia" userId="4924f6f5e1aaa61e" providerId="LiveId" clId="{09C1495C-8E32-402E-9C2F-2880E69A63EF}" dt="2020-12-03T02:37:06.799" v="8" actId="1076"/>
+      <pc:docMkLst>
+        <pc:docMk/>
+      </pc:docMkLst>
+      <pc:sldChg chg="modSp mod">
+        <pc:chgData name="Marcos Antonio Garcia" userId="4924f6f5e1aaa61e" providerId="LiveId" clId="{09C1495C-8E32-402E-9C2F-2880E69A63EF}" dt="2020-12-03T02:37:06.799" v="8" actId="1076"/>
+        <pc:sldMkLst>
+          <pc:docMk/>
+          <pc:sldMk cId="1441008742" sldId="263"/>
+        </pc:sldMkLst>
+        <pc:spChg chg="mod">
+          <ac:chgData name="Marcos Antonio Garcia" userId="4924f6f5e1aaa61e" providerId="LiveId" clId="{09C1495C-8E32-402E-9C2F-2880E69A63EF}" dt="2020-12-03T02:37:06.799" v="8" actId="1076"/>
+          <ac:spMkLst>
+            <pc:docMk/>
+            <pc:sldMk cId="1441008742" sldId="263"/>
+            <ac:spMk id="7" creationId="{FF42A79F-6350-48AA-88ED-033459252245}"/>
+          </ac:spMkLst>
+        </pc:spChg>
+      </pc:sldChg>
+    </pc:docChg>
+  </pc:docChgLst>
+</pc:chgInfo>
+</file>
+
 <file path=ppt/slideLayouts/slideLayout1.xml><?xml version="1.0" encoding="utf-8"?>
 <p:sldLayout xmlns:a="http://schemas.openxmlformats.org/drawingml/2006/main" xmlns:r="http://schemas.openxmlformats.org/officeDocument/2006/relationships" xmlns:p="http://schemas.openxmlformats.org/presentationml/2006/main" type="title" preserve="1">
   <p:cSld name="Slide de Título">
@@ -266,7 +295,7 @@
           <a:p>
             <a:fld id="{28FBD17E-6315-4AB0-B836-D5A4E8F933AA}" type="datetimeFigureOut">
               <a:rPr lang="pt-BR" smtClean="0"/>
-              <a:t>29/11/2020</a:t>
+              <a:t>02/12/2020</a:t>
             </a:fld>
             <a:endParaRPr lang="pt-BR"/>
           </a:p>
@@ -464,7 +493,7 @@
           <a:p>
             <a:fld id="{28FBD17E-6315-4AB0-B836-D5A4E8F933AA}" type="datetimeFigureOut">
               <a:rPr lang="pt-BR" smtClean="0"/>
-              <a:t>29/11/2020</a:t>
+              <a:t>02/12/2020</a:t>
             </a:fld>
             <a:endParaRPr lang="pt-BR"/>
           </a:p>
@@ -672,7 +701,7 @@
           <a:p>
             <a:fld id="{28FBD17E-6315-4AB0-B836-D5A4E8F933AA}" type="datetimeFigureOut">
               <a:rPr lang="pt-BR" smtClean="0"/>
-              <a:t>29/11/2020</a:t>
+              <a:t>02/12/2020</a:t>
             </a:fld>
             <a:endParaRPr lang="pt-BR"/>
           </a:p>
@@ -870,7 +899,7 @@
           <a:p>
             <a:fld id="{28FBD17E-6315-4AB0-B836-D5A4E8F933AA}" type="datetimeFigureOut">
               <a:rPr lang="pt-BR" smtClean="0"/>
-              <a:t>29/11/2020</a:t>
+              <a:t>02/12/2020</a:t>
             </a:fld>
             <a:endParaRPr lang="pt-BR"/>
           </a:p>
@@ -1145,7 +1174,7 @@
           <a:p>
             <a:fld id="{28FBD17E-6315-4AB0-B836-D5A4E8F933AA}" type="datetimeFigureOut">
               <a:rPr lang="pt-BR" smtClean="0"/>
-              <a:t>29/11/2020</a:t>
+              <a:t>02/12/2020</a:t>
             </a:fld>
             <a:endParaRPr lang="pt-BR"/>
           </a:p>
@@ -1410,7 +1439,7 @@
           <a:p>
             <a:fld id="{28FBD17E-6315-4AB0-B836-D5A4E8F933AA}" type="datetimeFigureOut">
               <a:rPr lang="pt-BR" smtClean="0"/>
-              <a:t>29/11/2020</a:t>
+              <a:t>02/12/2020</a:t>
             </a:fld>
             <a:endParaRPr lang="pt-BR"/>
           </a:p>
@@ -1822,7 +1851,7 @@
           <a:p>
             <a:fld id="{28FBD17E-6315-4AB0-B836-D5A4E8F933AA}" type="datetimeFigureOut">
               <a:rPr lang="pt-BR" smtClean="0"/>
-              <a:t>29/11/2020</a:t>
+              <a:t>02/12/2020</a:t>
             </a:fld>
             <a:endParaRPr lang="pt-BR"/>
           </a:p>
@@ -1963,7 +1992,7 @@
           <a:p>
             <a:fld id="{28FBD17E-6315-4AB0-B836-D5A4E8F933AA}" type="datetimeFigureOut">
               <a:rPr lang="pt-BR" smtClean="0"/>
-              <a:t>29/11/2020</a:t>
+              <a:t>02/12/2020</a:t>
             </a:fld>
             <a:endParaRPr lang="pt-BR"/>
           </a:p>
@@ -2076,7 +2105,7 @@
           <a:p>
             <a:fld id="{28FBD17E-6315-4AB0-B836-D5A4E8F933AA}" type="datetimeFigureOut">
               <a:rPr lang="pt-BR" smtClean="0"/>
-              <a:t>29/11/2020</a:t>
+              <a:t>02/12/2020</a:t>
             </a:fld>
             <a:endParaRPr lang="pt-BR"/>
           </a:p>
@@ -2387,7 +2416,7 @@
           <a:p>
             <a:fld id="{28FBD17E-6315-4AB0-B836-D5A4E8F933AA}" type="datetimeFigureOut">
               <a:rPr lang="pt-BR" smtClean="0"/>
-              <a:t>29/11/2020</a:t>
+              <a:t>02/12/2020</a:t>
             </a:fld>
             <a:endParaRPr lang="pt-BR"/>
           </a:p>
@@ -2675,7 +2704,7 @@
           <a:p>
             <a:fld id="{28FBD17E-6315-4AB0-B836-D5A4E8F933AA}" type="datetimeFigureOut">
               <a:rPr lang="pt-BR" smtClean="0"/>
-              <a:t>29/11/2020</a:t>
+              <a:t>02/12/2020</a:t>
             </a:fld>
             <a:endParaRPr lang="pt-BR"/>
           </a:p>
@@ -2916,7 +2945,7 @@
           <a:p>
             <a:fld id="{28FBD17E-6315-4AB0-B836-D5A4E8F933AA}" type="datetimeFigureOut">
               <a:rPr lang="pt-BR" smtClean="0"/>
-              <a:t>29/11/2020</a:t>
+              <a:t>02/12/2020</a:t>
             </a:fld>
             <a:endParaRPr lang="pt-BR"/>
           </a:p>
@@ -5412,7 +5441,7 @@
         </p:nvSpPr>
         <p:spPr>
           <a:xfrm>
-            <a:off x="3043403" y="2682063"/>
+            <a:off x="3043403" y="2924758"/>
             <a:ext cx="6105194" cy="2932975"/>
           </a:xfrm>
           <a:prstGeom prst="rect">
@@ -5594,7 +5623,7 @@
                   <a:srgbClr val="FFFFFF"/>
                 </a:solidFill>
               </a:rPr>
-              <a:t>Concluindo, o tema de games foi o tema que consegui encontrar que mais esteve presente em minha vida e conectou bem com meus dois valores apresentado. Agradeço, um bom dia e até a próxima.</a:t>
+              <a:t>O tema de games foi o tema que consegui encontrar que mais esteve presente em minha vida e conectou bem com meus dois valores apresentado. </a:t>
             </a:r>
           </a:p>
         </p:txBody>

</xml_diff>